<commit_message>
added a plot showing the updating of track lick
</commit_message>
<xml_diff>
--- a/Paper/tv_topo/JDSMC/figures/fifo.pptx
+++ b/Paper/tv_topo/JDSMC/figures/fifo.pptx
@@ -254,7 +254,7 @@
           <a:p>
             <a:fld id="{C19B0473-FC2E-AF41-B42D-4FCAC26A9EB6}" type="datetimeFigureOut">
               <a:rPr lang="en-US" smtClean="0"/>
-              <a:t>2/7/17</a:t>
+              <a:t>2/9/17</a:t>
             </a:fld>
             <a:endParaRPr lang="en-US"/>
           </a:p>
@@ -424,7 +424,7 @@
           <a:p>
             <a:fld id="{C19B0473-FC2E-AF41-B42D-4FCAC26A9EB6}" type="datetimeFigureOut">
               <a:rPr lang="en-US" smtClean="0"/>
-              <a:t>2/7/17</a:t>
+              <a:t>2/9/17</a:t>
             </a:fld>
             <a:endParaRPr lang="en-US"/>
           </a:p>
@@ -604,7 +604,7 @@
           <a:p>
             <a:fld id="{C19B0473-FC2E-AF41-B42D-4FCAC26A9EB6}" type="datetimeFigureOut">
               <a:rPr lang="en-US" smtClean="0"/>
-              <a:t>2/7/17</a:t>
+              <a:t>2/9/17</a:t>
             </a:fld>
             <a:endParaRPr lang="en-US"/>
           </a:p>
@@ -774,7 +774,7 @@
           <a:p>
             <a:fld id="{C19B0473-FC2E-AF41-B42D-4FCAC26A9EB6}" type="datetimeFigureOut">
               <a:rPr lang="en-US" smtClean="0"/>
-              <a:t>2/7/17</a:t>
+              <a:t>2/9/17</a:t>
             </a:fld>
             <a:endParaRPr lang="en-US"/>
           </a:p>
@@ -1018,7 +1018,7 @@
           <a:p>
             <a:fld id="{C19B0473-FC2E-AF41-B42D-4FCAC26A9EB6}" type="datetimeFigureOut">
               <a:rPr lang="en-US" smtClean="0"/>
-              <a:t>2/7/17</a:t>
+              <a:t>2/9/17</a:t>
             </a:fld>
             <a:endParaRPr lang="en-US"/>
           </a:p>
@@ -1250,7 +1250,7 @@
           <a:p>
             <a:fld id="{C19B0473-FC2E-AF41-B42D-4FCAC26A9EB6}" type="datetimeFigureOut">
               <a:rPr lang="en-US" smtClean="0"/>
-              <a:t>2/7/17</a:t>
+              <a:t>2/9/17</a:t>
             </a:fld>
             <a:endParaRPr lang="en-US"/>
           </a:p>
@@ -1617,7 +1617,7 @@
           <a:p>
             <a:fld id="{C19B0473-FC2E-AF41-B42D-4FCAC26A9EB6}" type="datetimeFigureOut">
               <a:rPr lang="en-US" smtClean="0"/>
-              <a:t>2/7/17</a:t>
+              <a:t>2/9/17</a:t>
             </a:fld>
             <a:endParaRPr lang="en-US"/>
           </a:p>
@@ -1735,7 +1735,7 @@
           <a:p>
             <a:fld id="{C19B0473-FC2E-AF41-B42D-4FCAC26A9EB6}" type="datetimeFigureOut">
               <a:rPr lang="en-US" smtClean="0"/>
-              <a:t>2/7/17</a:t>
+              <a:t>2/9/17</a:t>
             </a:fld>
             <a:endParaRPr lang="en-US"/>
           </a:p>
@@ -1830,7 +1830,7 @@
           <a:p>
             <a:fld id="{C19B0473-FC2E-AF41-B42D-4FCAC26A9EB6}" type="datetimeFigureOut">
               <a:rPr lang="en-US" smtClean="0"/>
-              <a:t>2/7/17</a:t>
+              <a:t>2/9/17</a:t>
             </a:fld>
             <a:endParaRPr lang="en-US"/>
           </a:p>
@@ -2107,7 +2107,7 @@
           <a:p>
             <a:fld id="{C19B0473-FC2E-AF41-B42D-4FCAC26A9EB6}" type="datetimeFigureOut">
               <a:rPr lang="en-US" smtClean="0"/>
-              <a:t>2/7/17</a:t>
+              <a:t>2/9/17</a:t>
             </a:fld>
             <a:endParaRPr lang="en-US"/>
           </a:p>
@@ -2364,7 +2364,7 @@
           <a:p>
             <a:fld id="{C19B0473-FC2E-AF41-B42D-4FCAC26A9EB6}" type="datetimeFigureOut">
               <a:rPr lang="en-US" smtClean="0"/>
-              <a:t>2/7/17</a:t>
+              <a:t>2/9/17</a:t>
             </a:fld>
             <a:endParaRPr lang="en-US"/>
           </a:p>
@@ -2577,7 +2577,7 @@
           <a:p>
             <a:fld id="{C19B0473-FC2E-AF41-B42D-4FCAC26A9EB6}" type="datetimeFigureOut">
               <a:rPr lang="en-US" smtClean="0"/>
-              <a:t>2/7/17</a:t>
+              <a:t>2/9/17</a:t>
             </a:fld>
             <a:endParaRPr lang="en-US"/>
           </a:p>
@@ -7256,8 +7256,8 @@
         </p:nvCxnSpPr>
         <p:spPr>
           <a:xfrm flipH="1">
-            <a:off x="3811601" y="1125403"/>
-            <a:ext cx="499847" cy="305954"/>
+            <a:off x="3791781" y="1125403"/>
+            <a:ext cx="519668" cy="316247"/>
           </a:xfrm>
           <a:prstGeom prst="straightConnector1">
             <a:avLst/>
@@ -7289,8 +7289,8 @@
         </p:nvCxnSpPr>
         <p:spPr>
           <a:xfrm flipH="1">
-            <a:off x="3811601" y="1876254"/>
-            <a:ext cx="507336" cy="327125"/>
+            <a:off x="3791781" y="1876254"/>
+            <a:ext cx="527156" cy="332475"/>
           </a:xfrm>
           <a:prstGeom prst="straightConnector1">
             <a:avLst/>
@@ -7388,8 +7388,8 @@
         </p:nvCxnSpPr>
         <p:spPr>
           <a:xfrm>
-            <a:off x="3817938" y="3424341"/>
-            <a:ext cx="487172" cy="333422"/>
+            <a:off x="3791781" y="3431031"/>
+            <a:ext cx="513329" cy="326732"/>
           </a:xfrm>
           <a:prstGeom prst="straightConnector1">
             <a:avLst/>
@@ -7421,8 +7421,8 @@
         </p:nvCxnSpPr>
         <p:spPr>
           <a:xfrm flipH="1">
-            <a:off x="3810662" y="4207225"/>
-            <a:ext cx="522084" cy="321644"/>
+            <a:off x="3791781" y="4207225"/>
+            <a:ext cx="540965" cy="327658"/>
           </a:xfrm>
           <a:prstGeom prst="straightConnector1">
             <a:avLst/>
@@ -7454,8 +7454,8 @@
         </p:nvCxnSpPr>
         <p:spPr>
           <a:xfrm>
-            <a:off x="6223413" y="4964317"/>
-            <a:ext cx="573032" cy="339141"/>
+            <a:off x="6248606" y="4206213"/>
+            <a:ext cx="546005" cy="328670"/>
           </a:xfrm>
           <a:prstGeom prst="straightConnector1">
             <a:avLst/>
@@ -8186,30 +8186,6 @@
         <p:spPr>
           <a:xfrm>
             <a:off x="6915320" y="3859963"/>
-            <a:ext cx="279400" cy="254000"/>
-          </a:xfrm>
-          <a:prstGeom prst="rect">
-            <a:avLst/>
-          </a:prstGeom>
-        </p:spPr>
-      </p:pic>
-      <p:pic>
-        <p:nvPicPr>
-          <p:cNvPr id="128" name="Picture 127"/>
-          <p:cNvPicPr>
-            <a:picLocks noChangeAspect="1"/>
-          </p:cNvPicPr>
-          <p:nvPr/>
-        </p:nvPicPr>
-        <p:blipFill>
-          <a:blip r:embed="rId4"/>
-          <a:stretch>
-            <a:fillRect/>
-          </a:stretch>
-        </p:blipFill>
-        <p:spPr>
-          <a:xfrm>
-            <a:off x="6907279" y="4620601"/>
             <a:ext cx="279400" cy="254000"/>
           </a:xfrm>
           <a:prstGeom prst="rect">
@@ -9431,30 +9407,6 @@
       </p:pic>
       <p:pic>
         <p:nvPicPr>
-          <p:cNvPr id="167" name="Picture 166"/>
-          <p:cNvPicPr>
-            <a:picLocks noChangeAspect="1"/>
-          </p:cNvPicPr>
-          <p:nvPr/>
-        </p:nvPicPr>
-        <p:blipFill>
-          <a:blip r:embed="rId17"/>
-          <a:stretch>
-            <a:fillRect/>
-          </a:stretch>
-        </p:blipFill>
-        <p:spPr>
-          <a:xfrm>
-            <a:off x="3250369" y="5317202"/>
-            <a:ext cx="482600" cy="381000"/>
-          </a:xfrm>
-          <a:prstGeom prst="rect">
-            <a:avLst/>
-          </a:prstGeom>
-        </p:spPr>
-      </p:pic>
-      <p:pic>
-        <p:nvPicPr>
           <p:cNvPr id="168" name="Picture 167"/>
           <p:cNvPicPr>
             <a:picLocks noChangeAspect="1"/>
@@ -9551,54 +9503,6 @@
       </p:pic>
       <p:pic>
         <p:nvPicPr>
-          <p:cNvPr id="172" name="Picture 171"/>
-          <p:cNvPicPr>
-            <a:picLocks noChangeAspect="1"/>
-          </p:cNvPicPr>
-          <p:nvPr/>
-        </p:nvPicPr>
-        <p:blipFill>
-          <a:blip r:embed="rId13"/>
-          <a:stretch>
-            <a:fillRect/>
-          </a:stretch>
-        </p:blipFill>
-        <p:spPr>
-          <a:xfrm>
-            <a:off x="7502498" y="4560819"/>
-            <a:ext cx="482600" cy="381000"/>
-          </a:xfrm>
-          <a:prstGeom prst="rect">
-            <a:avLst/>
-          </a:prstGeom>
-        </p:spPr>
-      </p:pic>
-      <p:pic>
-        <p:nvPicPr>
-          <p:cNvPr id="173" name="Picture 172"/>
-          <p:cNvPicPr>
-            <a:picLocks noChangeAspect="1"/>
-          </p:cNvPicPr>
-          <p:nvPr/>
-        </p:nvPicPr>
-        <p:blipFill>
-          <a:blip r:embed="rId10"/>
-          <a:stretch>
-            <a:fillRect/>
-          </a:stretch>
-        </p:blipFill>
-        <p:spPr>
-          <a:xfrm>
-            <a:off x="7496491" y="5327419"/>
-            <a:ext cx="482600" cy="381000"/>
-          </a:xfrm>
-          <a:prstGeom prst="rect">
-            <a:avLst/>
-          </a:prstGeom>
-        </p:spPr>
-      </p:pic>
-      <p:pic>
-        <p:nvPicPr>
           <p:cNvPr id="174" name="Picture 173"/>
           <p:cNvPicPr>
             <a:picLocks noChangeAspect="1"/>
@@ -9669,9 +9573,263 @@
           </a:prstGeom>
         </p:spPr>
       </p:pic>
+      <p:sp>
+        <p:nvSpPr>
+          <p:cNvPr id="30" name="Freeform 29"/>
+          <p:cNvSpPr/>
+          <p:nvPr/>
+        </p:nvSpPr>
+        <p:spPr>
+          <a:xfrm>
+            <a:off x="3792000" y="4962525"/>
+            <a:ext cx="3010245" cy="323153"/>
+          </a:xfrm>
+          <a:custGeom>
+            <a:avLst/>
+            <a:gdLst>
+              <a:gd name="connsiteX0" fmla="*/ 241 w 2988768"/>
+              <a:gd name="connsiteY0" fmla="*/ 0 h 301083"/>
+              <a:gd name="connsiteX1" fmla="*/ 435139 w 2988768"/>
+              <a:gd name="connsiteY1" fmla="*/ 167268 h 301083"/>
+              <a:gd name="connsiteX2" fmla="*/ 2631929 w 2988768"/>
+              <a:gd name="connsiteY2" fmla="*/ 156117 h 301083"/>
+              <a:gd name="connsiteX3" fmla="*/ 2988768 w 2988768"/>
+              <a:gd name="connsiteY3" fmla="*/ 301083 h 301083"/>
+              <a:gd name="connsiteX0" fmla="*/ 26 w 2988553"/>
+              <a:gd name="connsiteY0" fmla="*/ 0 h 301083"/>
+              <a:gd name="connsiteX1" fmla="*/ 534562 w 2988553"/>
+              <a:gd name="connsiteY1" fmla="*/ 136099 h 301083"/>
+              <a:gd name="connsiteX2" fmla="*/ 2631714 w 2988553"/>
+              <a:gd name="connsiteY2" fmla="*/ 156117 h 301083"/>
+              <a:gd name="connsiteX3" fmla="*/ 2988553 w 2988553"/>
+              <a:gd name="connsiteY3" fmla="*/ 301083 h 301083"/>
+              <a:gd name="connsiteX0" fmla="*/ 25 w 2988552"/>
+              <a:gd name="connsiteY0" fmla="*/ 0 h 301083"/>
+              <a:gd name="connsiteX1" fmla="*/ 534561 w 2988552"/>
+              <a:gd name="connsiteY1" fmla="*/ 136099 h 301083"/>
+              <a:gd name="connsiteX2" fmla="*/ 2587430 w 2988552"/>
+              <a:gd name="connsiteY2" fmla="*/ 218455 h 301083"/>
+              <a:gd name="connsiteX3" fmla="*/ 2988552 w 2988552"/>
+              <a:gd name="connsiteY3" fmla="*/ 301083 h 301083"/>
+            </a:gdLst>
+            <a:ahLst/>
+            <a:cxnLst>
+              <a:cxn ang="0">
+                <a:pos x="connsiteX0" y="connsiteY0"/>
+              </a:cxn>
+              <a:cxn ang="0">
+                <a:pos x="connsiteX1" y="connsiteY1"/>
+              </a:cxn>
+              <a:cxn ang="0">
+                <a:pos x="connsiteX2" y="connsiteY2"/>
+              </a:cxn>
+              <a:cxn ang="0">
+                <a:pos x="connsiteX3" y="connsiteY3"/>
+              </a:cxn>
+            </a:cxnLst>
+            <a:rect l="l" t="t" r="r" b="b"/>
+            <a:pathLst>
+              <a:path w="2988552" h="301083">
+                <a:moveTo>
+                  <a:pt x="25" y="0"/>
+                </a:moveTo>
+                <a:cubicBezTo>
+                  <a:pt x="-1834" y="70624"/>
+                  <a:pt x="103327" y="99690"/>
+                  <a:pt x="534561" y="136099"/>
+                </a:cubicBezTo>
+                <a:cubicBezTo>
+                  <a:pt x="965795" y="172508"/>
+                  <a:pt x="2178432" y="190958"/>
+                  <a:pt x="2587430" y="218455"/>
+                </a:cubicBezTo>
+                <a:cubicBezTo>
+                  <a:pt x="2996428" y="245952"/>
+                  <a:pt x="2940230" y="284356"/>
+                  <a:pt x="2988552" y="301083"/>
+                </a:cubicBezTo>
+              </a:path>
+            </a:pathLst>
+          </a:custGeom>
+          <a:noFill/>
+          <a:ln w="25400">
+            <a:solidFill>
+              <a:schemeClr val="tx1"/>
+            </a:solidFill>
+            <a:tailEnd type="arrow"/>
+          </a:ln>
+        </p:spPr>
+        <p:style>
+          <a:lnRef idx="2">
+            <a:schemeClr val="accent1">
+              <a:shade val="50000"/>
+            </a:schemeClr>
+          </a:lnRef>
+          <a:fillRef idx="1">
+            <a:schemeClr val="accent1"/>
+          </a:fillRef>
+          <a:effectRef idx="0">
+            <a:schemeClr val="accent1"/>
+          </a:effectRef>
+          <a:fontRef idx="minor">
+            <a:schemeClr val="lt1"/>
+          </a:fontRef>
+        </p:style>
+        <p:txBody>
+          <a:bodyPr rtlCol="0" anchor="ctr"/>
+          <a:lstStyle/>
+          <a:p>
+            <a:pPr algn="ctr"/>
+            <a:endParaRPr lang="en-US"/>
+          </a:p>
+        </p:txBody>
+      </p:sp>
+      <p:sp>
+        <p:nvSpPr>
+          <p:cNvPr id="134" name="Freeform 133"/>
+          <p:cNvSpPr/>
+          <p:nvPr/>
+        </p:nvSpPr>
+        <p:spPr>
+          <a:xfrm flipH="1">
+            <a:off x="3766336" y="4991439"/>
+            <a:ext cx="3010224" cy="323153"/>
+          </a:xfrm>
+          <a:custGeom>
+            <a:avLst/>
+            <a:gdLst>
+              <a:gd name="connsiteX0" fmla="*/ 241 w 2988768"/>
+              <a:gd name="connsiteY0" fmla="*/ 0 h 301083"/>
+              <a:gd name="connsiteX1" fmla="*/ 435139 w 2988768"/>
+              <a:gd name="connsiteY1" fmla="*/ 167268 h 301083"/>
+              <a:gd name="connsiteX2" fmla="*/ 2631929 w 2988768"/>
+              <a:gd name="connsiteY2" fmla="*/ 156117 h 301083"/>
+              <a:gd name="connsiteX3" fmla="*/ 2988768 w 2988768"/>
+              <a:gd name="connsiteY3" fmla="*/ 301083 h 301083"/>
+              <a:gd name="connsiteX0" fmla="*/ 4 w 2988531"/>
+              <a:gd name="connsiteY0" fmla="*/ 0 h 301083"/>
+              <a:gd name="connsiteX1" fmla="*/ 1099154 w 2988531"/>
+              <a:gd name="connsiteY1" fmla="*/ 208827 h 301083"/>
+              <a:gd name="connsiteX2" fmla="*/ 2631692 w 2988531"/>
+              <a:gd name="connsiteY2" fmla="*/ 156117 h 301083"/>
+              <a:gd name="connsiteX3" fmla="*/ 2988531 w 2988531"/>
+              <a:gd name="connsiteY3" fmla="*/ 301083 h 301083"/>
+              <a:gd name="connsiteX0" fmla="*/ 4 w 2988531"/>
+              <a:gd name="connsiteY0" fmla="*/ 0 h 301083"/>
+              <a:gd name="connsiteX1" fmla="*/ 1099154 w 2988531"/>
+              <a:gd name="connsiteY1" fmla="*/ 208827 h 301083"/>
+              <a:gd name="connsiteX2" fmla="*/ 2543125 w 2988531"/>
+              <a:gd name="connsiteY2" fmla="*/ 197676 h 301083"/>
+              <a:gd name="connsiteX3" fmla="*/ 2988531 w 2988531"/>
+              <a:gd name="connsiteY3" fmla="*/ 301083 h 301083"/>
+              <a:gd name="connsiteX0" fmla="*/ 4 w 2988531"/>
+              <a:gd name="connsiteY0" fmla="*/ 0 h 301083"/>
+              <a:gd name="connsiteX1" fmla="*/ 1276288 w 2988531"/>
+              <a:gd name="connsiteY1" fmla="*/ 136099 h 301083"/>
+              <a:gd name="connsiteX2" fmla="*/ 2543125 w 2988531"/>
+              <a:gd name="connsiteY2" fmla="*/ 197676 h 301083"/>
+              <a:gd name="connsiteX3" fmla="*/ 2988531 w 2988531"/>
+              <a:gd name="connsiteY3" fmla="*/ 301083 h 301083"/>
+            </a:gdLst>
+            <a:ahLst/>
+            <a:cxnLst>
+              <a:cxn ang="0">
+                <a:pos x="connsiteX0" y="connsiteY0"/>
+              </a:cxn>
+              <a:cxn ang="0">
+                <a:pos x="connsiteX1" y="connsiteY1"/>
+              </a:cxn>
+              <a:cxn ang="0">
+                <a:pos x="connsiteX2" y="connsiteY2"/>
+              </a:cxn>
+              <a:cxn ang="0">
+                <a:pos x="connsiteX3" y="connsiteY3"/>
+              </a:cxn>
+            </a:cxnLst>
+            <a:rect l="l" t="t" r="r" b="b"/>
+            <a:pathLst>
+              <a:path w="2988531" h="301083">
+                <a:moveTo>
+                  <a:pt x="4" y="0"/>
+                </a:moveTo>
+                <a:cubicBezTo>
+                  <a:pt x="-1855" y="70624"/>
+                  <a:pt x="852435" y="103153"/>
+                  <a:pt x="1276288" y="136099"/>
+                </a:cubicBezTo>
+                <a:cubicBezTo>
+                  <a:pt x="1700141" y="169045"/>
+                  <a:pt x="2257751" y="170179"/>
+                  <a:pt x="2543125" y="197676"/>
+                </a:cubicBezTo>
+                <a:cubicBezTo>
+                  <a:pt x="2828499" y="225173"/>
+                  <a:pt x="2940209" y="284356"/>
+                  <a:pt x="2988531" y="301083"/>
+                </a:cubicBezTo>
+              </a:path>
+            </a:pathLst>
+          </a:custGeom>
+          <a:noFill/>
+          <a:ln w="25400">
+            <a:solidFill>
+              <a:schemeClr val="tx1"/>
+            </a:solidFill>
+            <a:tailEnd type="arrow"/>
+          </a:ln>
+        </p:spPr>
+        <p:style>
+          <a:lnRef idx="2">
+            <a:schemeClr val="accent1">
+              <a:shade val="50000"/>
+            </a:schemeClr>
+          </a:lnRef>
+          <a:fillRef idx="1">
+            <a:schemeClr val="accent1"/>
+          </a:fillRef>
+          <a:effectRef idx="0">
+            <a:schemeClr val="accent1"/>
+          </a:effectRef>
+          <a:fontRef idx="minor">
+            <a:schemeClr val="lt1"/>
+          </a:fontRef>
+        </p:style>
+        <p:txBody>
+          <a:bodyPr rtlCol="0" anchor="ctr"/>
+          <a:lstStyle/>
+          <a:p>
+            <a:pPr algn="ctr"/>
+            <a:endParaRPr lang="en-US"/>
+          </a:p>
+        </p:txBody>
+      </p:sp>
       <p:pic>
         <p:nvPicPr>
-          <p:cNvPr id="177" name="Picture 176"/>
+          <p:cNvPr id="135" name="Picture 134"/>
+          <p:cNvPicPr>
+            <a:picLocks noChangeAspect="1"/>
+          </p:cNvPicPr>
+          <p:nvPr/>
+        </p:nvPicPr>
+        <p:blipFill>
+          <a:blip r:embed="rId11"/>
+          <a:stretch>
+            <a:fillRect/>
+          </a:stretch>
+        </p:blipFill>
+        <p:spPr>
+          <a:xfrm>
+            <a:off x="7490141" y="4554173"/>
+            <a:ext cx="495300" cy="381000"/>
+          </a:xfrm>
+          <a:prstGeom prst="rect">
+            <a:avLst/>
+          </a:prstGeom>
+        </p:spPr>
+      </p:pic>
+      <p:pic>
+        <p:nvPicPr>
+          <p:cNvPr id="137" name="Picture 136"/>
           <p:cNvPicPr>
             <a:picLocks noChangeAspect="1"/>
           </p:cNvPicPr>
@@ -9685,8 +9843,80 @@
         </p:blipFill>
         <p:spPr>
           <a:xfrm>
-            <a:off x="6867973" y="5317202"/>
+            <a:off x="6867973" y="4556005"/>
             <a:ext cx="482600" cy="381000"/>
+          </a:xfrm>
+          <a:prstGeom prst="rect">
+            <a:avLst/>
+          </a:prstGeom>
+        </p:spPr>
+      </p:pic>
+      <p:pic>
+        <p:nvPicPr>
+          <p:cNvPr id="142" name="Picture 141"/>
+          <p:cNvPicPr>
+            <a:picLocks noChangeAspect="1"/>
+          </p:cNvPicPr>
+          <p:nvPr/>
+        </p:nvPicPr>
+        <p:blipFill>
+          <a:blip r:embed="rId19"/>
+          <a:stretch>
+            <a:fillRect/>
+          </a:stretch>
+        </p:blipFill>
+        <p:spPr>
+          <a:xfrm>
+            <a:off x="3251304" y="5338774"/>
+            <a:ext cx="482600" cy="381000"/>
+          </a:xfrm>
+          <a:prstGeom prst="rect">
+            <a:avLst/>
+          </a:prstGeom>
+        </p:spPr>
+      </p:pic>
+      <p:pic>
+        <p:nvPicPr>
+          <p:cNvPr id="143" name="Picture 142"/>
+          <p:cNvPicPr>
+            <a:picLocks noChangeAspect="1"/>
+          </p:cNvPicPr>
+          <p:nvPr/>
+        </p:nvPicPr>
+        <p:blipFill>
+          <a:blip r:embed="rId7"/>
+          <a:stretch>
+            <a:fillRect/>
+          </a:stretch>
+        </p:blipFill>
+        <p:spPr>
+          <a:xfrm>
+            <a:off x="6866759" y="5326386"/>
+            <a:ext cx="482600" cy="381000"/>
+          </a:xfrm>
+          <a:prstGeom prst="rect">
+            <a:avLst/>
+          </a:prstGeom>
+        </p:spPr>
+      </p:pic>
+      <p:pic>
+        <p:nvPicPr>
+          <p:cNvPr id="178" name="Picture 177"/>
+          <p:cNvPicPr>
+            <a:picLocks noChangeAspect="1"/>
+          </p:cNvPicPr>
+          <p:nvPr/>
+        </p:nvPicPr>
+        <p:blipFill>
+          <a:blip r:embed="rId11"/>
+          <a:stretch>
+            <a:fillRect/>
+          </a:stretch>
+        </p:blipFill>
+        <p:spPr>
+          <a:xfrm>
+            <a:off x="7493109" y="5334703"/>
+            <a:ext cx="495300" cy="381000"/>
           </a:xfrm>
           <a:prstGeom prst="rect">
             <a:avLst/>

</xml_diff>